<commit_message>
Adicionado parâmetro dia no SafeQueue Config.
</commit_message>
<xml_diff>
--- a/Docs/Fluxograma.pptx
+++ b/Docs/Fluxograma.pptx
@@ -6,6 +6,7 @@
   </p:sldMasterIdLst>
   <p:sldIdLst>
     <p:sldId id="256" r:id="rId2"/>
+    <p:sldId id="257" r:id="rId3"/>
   </p:sldIdLst>
   <p:sldSz cx="12192000" cy="6858000"/>
   <p:notesSz cx="6858000" cy="9144000"/>
@@ -104,6 +105,11 @@
       </a:defRPr>
     </a:lvl9pPr>
   </p:defaultTextStyle>
+  <p:extLst>
+    <p:ext uri="{EFAFB233-063F-42B5-8137-9DF3F51BA10A}">
+      <p15:sldGuideLst xmlns:p15="http://schemas.microsoft.com/office/powerpoint/2012/main"/>
+    </p:ext>
+  </p:extLst>
 </p:presentation>
 </file>
 
@@ -258,7 +264,7 @@
           <a:p>
             <a:fld id="{53E995BD-5B94-48DC-B4E8-E40A5F9CD170}" type="datetimeFigureOut">
               <a:rPr lang="pt-BR" smtClean="0"/>
-              <a:t>24/11/2017</a:t>
+              <a:t>27/11/2017</a:t>
             </a:fld>
             <a:endParaRPr lang="pt-BR"/>
           </a:p>
@@ -456,7 +462,7 @@
           <a:p>
             <a:fld id="{53E995BD-5B94-48DC-B4E8-E40A5F9CD170}" type="datetimeFigureOut">
               <a:rPr lang="pt-BR" smtClean="0"/>
-              <a:t>24/11/2017</a:t>
+              <a:t>27/11/2017</a:t>
             </a:fld>
             <a:endParaRPr lang="pt-BR"/>
           </a:p>
@@ -664,7 +670,7 @@
           <a:p>
             <a:fld id="{53E995BD-5B94-48DC-B4E8-E40A5F9CD170}" type="datetimeFigureOut">
               <a:rPr lang="pt-BR" smtClean="0"/>
-              <a:t>24/11/2017</a:t>
+              <a:t>27/11/2017</a:t>
             </a:fld>
             <a:endParaRPr lang="pt-BR"/>
           </a:p>
@@ -862,7 +868,7 @@
           <a:p>
             <a:fld id="{53E995BD-5B94-48DC-B4E8-E40A5F9CD170}" type="datetimeFigureOut">
               <a:rPr lang="pt-BR" smtClean="0"/>
-              <a:t>24/11/2017</a:t>
+              <a:t>27/11/2017</a:t>
             </a:fld>
             <a:endParaRPr lang="pt-BR"/>
           </a:p>
@@ -1137,7 +1143,7 @@
           <a:p>
             <a:fld id="{53E995BD-5B94-48DC-B4E8-E40A5F9CD170}" type="datetimeFigureOut">
               <a:rPr lang="pt-BR" smtClean="0"/>
-              <a:t>24/11/2017</a:t>
+              <a:t>27/11/2017</a:t>
             </a:fld>
             <a:endParaRPr lang="pt-BR"/>
           </a:p>
@@ -1402,7 +1408,7 @@
           <a:p>
             <a:fld id="{53E995BD-5B94-48DC-B4E8-E40A5F9CD170}" type="datetimeFigureOut">
               <a:rPr lang="pt-BR" smtClean="0"/>
-              <a:t>24/11/2017</a:t>
+              <a:t>27/11/2017</a:t>
             </a:fld>
             <a:endParaRPr lang="pt-BR"/>
           </a:p>
@@ -1814,7 +1820,7 @@
           <a:p>
             <a:fld id="{53E995BD-5B94-48DC-B4E8-E40A5F9CD170}" type="datetimeFigureOut">
               <a:rPr lang="pt-BR" smtClean="0"/>
-              <a:t>24/11/2017</a:t>
+              <a:t>27/11/2017</a:t>
             </a:fld>
             <a:endParaRPr lang="pt-BR"/>
           </a:p>
@@ -1955,7 +1961,7 @@
           <a:p>
             <a:fld id="{53E995BD-5B94-48DC-B4E8-E40A5F9CD170}" type="datetimeFigureOut">
               <a:rPr lang="pt-BR" smtClean="0"/>
-              <a:t>24/11/2017</a:t>
+              <a:t>27/11/2017</a:t>
             </a:fld>
             <a:endParaRPr lang="pt-BR"/>
           </a:p>
@@ -2068,7 +2074,7 @@
           <a:p>
             <a:fld id="{53E995BD-5B94-48DC-B4E8-E40A5F9CD170}" type="datetimeFigureOut">
               <a:rPr lang="pt-BR" smtClean="0"/>
-              <a:t>24/11/2017</a:t>
+              <a:t>27/11/2017</a:t>
             </a:fld>
             <a:endParaRPr lang="pt-BR"/>
           </a:p>
@@ -2379,7 +2385,7 @@
           <a:p>
             <a:fld id="{53E995BD-5B94-48DC-B4E8-E40A5F9CD170}" type="datetimeFigureOut">
               <a:rPr lang="pt-BR" smtClean="0"/>
-              <a:t>24/11/2017</a:t>
+              <a:t>27/11/2017</a:t>
             </a:fld>
             <a:endParaRPr lang="pt-BR"/>
           </a:p>
@@ -2667,7 +2673,7 @@
           <a:p>
             <a:fld id="{53E995BD-5B94-48DC-B4E8-E40A5F9CD170}" type="datetimeFigureOut">
               <a:rPr lang="pt-BR" smtClean="0"/>
-              <a:t>24/11/2017</a:t>
+              <a:t>27/11/2017</a:t>
             </a:fld>
             <a:endParaRPr lang="pt-BR"/>
           </a:p>
@@ -2908,7 +2914,7 @@
           <a:p>
             <a:fld id="{53E995BD-5B94-48DC-B4E8-E40A5F9CD170}" type="datetimeFigureOut">
               <a:rPr lang="pt-BR" smtClean="0"/>
-              <a:t>24/11/2017</a:t>
+              <a:t>27/11/2017</a:t>
             </a:fld>
             <a:endParaRPr lang="pt-BR"/>
           </a:p>
@@ -3397,6 +3403,9 @@
           <a:prstGeom prst="rightArrow">
             <a:avLst/>
           </a:prstGeom>
+          <a:solidFill>
+            <a:srgbClr val="FFFF00"/>
+          </a:solidFill>
           <a:ln>
             <a:solidFill>
               <a:schemeClr val="tx1"/>
@@ -3425,7 +3434,11 @@
           <a:p>
             <a:pPr algn="ctr"/>
             <a:r>
-              <a:rPr lang="pt-BR" sz="1200" dirty="0"/>
+              <a:rPr lang="pt-BR" sz="1200" dirty="0">
+                <a:solidFill>
+                  <a:schemeClr val="tx1"/>
+                </a:solidFill>
+              </a:rPr>
               <a:t>Recebe MSG</a:t>
             </a:r>
           </a:p>
@@ -3445,7 +3458,7 @@
         </p:nvSpPr>
         <p:spPr>
           <a:xfrm>
-            <a:off x="4992499" y="5105400"/>
+            <a:off x="118495" y="6194055"/>
             <a:ext cx="1979801" cy="503339"/>
           </a:xfrm>
           <a:prstGeom prst="rect">
@@ -3500,7 +3513,7 @@
         </p:nvSpPr>
         <p:spPr>
           <a:xfrm>
-            <a:off x="4992499" y="5675850"/>
+            <a:off x="4279435" y="6194055"/>
             <a:ext cx="1979801" cy="503339"/>
           </a:xfrm>
           <a:prstGeom prst="rect">
@@ -3560,7 +3573,7 @@
         </p:nvSpPr>
         <p:spPr>
           <a:xfrm>
-            <a:off x="4992499" y="6242107"/>
+            <a:off x="2198965" y="6194055"/>
             <a:ext cx="1979801" cy="503339"/>
           </a:xfrm>
           <a:prstGeom prst="rect">
@@ -3880,7 +3893,7 @@
         </p:nvSpPr>
         <p:spPr>
           <a:xfrm>
-            <a:off x="4992499" y="6808364"/>
+            <a:off x="6359905" y="6189862"/>
             <a:ext cx="1979801" cy="503339"/>
           </a:xfrm>
           <a:prstGeom prst="rect">
@@ -4572,7 +4585,7 @@
         <p:spPr>
           <a:xfrm>
             <a:off x="7278499" y="963123"/>
-            <a:ext cx="2705100" cy="1637202"/>
+            <a:ext cx="2705100" cy="1847474"/>
           </a:xfrm>
           <a:prstGeom prst="rect">
             <a:avLst/>
@@ -4706,7 +4719,7 @@
         <p:spPr>
           <a:xfrm>
             <a:off x="7347904" y="1602387"/>
-            <a:ext cx="2559494" cy="551360"/>
+            <a:ext cx="2559494" cy="818260"/>
           </a:xfrm>
           <a:prstGeom prst="rect">
             <a:avLst/>
@@ -4734,7 +4747,7 @@
           </a:fontRef>
         </p:style>
         <p:txBody>
-          <a:bodyPr rtlCol="0" anchor="ctr"/>
+          <a:bodyPr rtlCol="0" anchor="t"/>
           <a:lstStyle/>
           <a:p>
             <a:pPr marL="171450" indent="-171450">
@@ -4758,15 +4771,7 @@
             </a:pPr>
             <a:r>
               <a:rPr lang="pt-BR" sz="1200" dirty="0"/>
-              <a:t>Caso não exista chamar </a:t>
-            </a:r>
-            <a:r>
-              <a:rPr lang="pt-BR" sz="1200" dirty="0" err="1"/>
-              <a:t>getMessage</a:t>
-            </a:r>
-            <a:r>
-              <a:rPr lang="pt-BR" sz="1200" dirty="0"/>
-              <a:t>()</a:t>
+              <a:t>Caso não exista chamar</a:t>
             </a:r>
           </a:p>
         </p:txBody>
@@ -4785,7 +4790,7 @@
         </p:nvSpPr>
         <p:spPr>
           <a:xfrm>
-            <a:off x="7347903" y="2220286"/>
+            <a:off x="7347903" y="2450771"/>
             <a:ext cx="2559495" cy="291960"/>
           </a:xfrm>
           <a:prstGeom prst="rect">
@@ -4852,6 +4857,9 @@
           <a:prstGeom prst="rightArrow">
             <a:avLst/>
           </a:prstGeom>
+          <a:solidFill>
+            <a:srgbClr val="FFFF00"/>
+          </a:solidFill>
           <a:ln>
             <a:solidFill>
               <a:schemeClr val="tx1"/>
@@ -4880,7 +4888,11 @@
           <a:p>
             <a:pPr algn="ctr"/>
             <a:r>
-              <a:rPr lang="pt-BR" sz="1200" dirty="0"/>
+              <a:rPr lang="pt-BR" sz="1200" dirty="0">
+                <a:solidFill>
+                  <a:schemeClr val="tx1"/>
+                </a:solidFill>
+              </a:rPr>
               <a:t>Manda MSG</a:t>
             </a:r>
           </a:p>
@@ -4906,6 +4918,9 @@
           <a:prstGeom prst="rightArrow">
             <a:avLst/>
           </a:prstGeom>
+          <a:solidFill>
+            <a:srgbClr val="FFFF00"/>
+          </a:solidFill>
           <a:ln>
             <a:solidFill>
               <a:schemeClr val="tx1"/>
@@ -4934,23 +4949,35 @@
           <a:p>
             <a:pPr algn="ctr"/>
             <a:r>
-              <a:rPr lang="pt-BR" sz="1200" dirty="0"/>
+              <a:rPr lang="pt-BR" sz="1200" dirty="0">
+                <a:solidFill>
+                  <a:schemeClr val="tx1"/>
+                </a:solidFill>
+              </a:rPr>
               <a:t>ACK </a:t>
             </a:r>
             <a:r>
-              <a:rPr lang="pt-BR" sz="1200" dirty="0" err="1"/>
+              <a:rPr lang="pt-BR" sz="1200" dirty="0" err="1">
+                <a:solidFill>
+                  <a:schemeClr val="tx1"/>
+                </a:solidFill>
+              </a:rPr>
               <a:t>Error</a:t>
             </a:r>
-            <a:endParaRPr lang="pt-BR" sz="1200" dirty="0"/>
-          </a:p>
-        </p:txBody>
-      </p:sp>
-      <p:sp>
-        <p:nvSpPr>
-          <p:cNvPr id="33" name="Retângulo 32">
-            <a:extLst>
-              <a:ext uri="{FF2B5EF4-FFF2-40B4-BE49-F238E27FC236}">
-                <a16:creationId xmlns:a16="http://schemas.microsoft.com/office/drawing/2014/main" id="{69B49832-E9EA-4400-881B-352CF15DEC5A}"/>
+            <a:endParaRPr lang="pt-BR" sz="1200" dirty="0">
+              <a:solidFill>
+                <a:schemeClr val="tx1"/>
+              </a:solidFill>
+            </a:endParaRPr>
+          </a:p>
+        </p:txBody>
+      </p:sp>
+      <p:sp>
+        <p:nvSpPr>
+          <p:cNvPr id="39" name="Seta: para a Direita 38">
+            <a:extLst>
+              <a:ext uri="{FF2B5EF4-FFF2-40B4-BE49-F238E27FC236}">
+                <a16:creationId xmlns:a16="http://schemas.microsoft.com/office/drawing/2014/main" id="{2D78E91D-1B7A-4ADA-A362-0428D41AC520}"/>
               </a:ext>
             </a:extLst>
           </p:cNvPr>
@@ -4959,7 +4986,73 @@
         </p:nvSpPr>
         <p:spPr>
           <a:xfrm>
-            <a:off x="1914525" y="2881090"/>
+            <a:off x="436687" y="3363286"/>
+            <a:ext cx="1107347" cy="436228"/>
+          </a:xfrm>
+          <a:prstGeom prst="rightArrow">
+            <a:avLst/>
+          </a:prstGeom>
+          <a:solidFill>
+            <a:srgbClr val="FFFF00"/>
+          </a:solidFill>
+          <a:ln>
+            <a:solidFill>
+              <a:schemeClr val="tx1"/>
+            </a:solidFill>
+          </a:ln>
+        </p:spPr>
+        <p:style>
+          <a:lnRef idx="2">
+            <a:schemeClr val="accent1">
+              <a:shade val="50000"/>
+            </a:schemeClr>
+          </a:lnRef>
+          <a:fillRef idx="1">
+            <a:schemeClr val="accent1"/>
+          </a:fillRef>
+          <a:effectRef idx="0">
+            <a:schemeClr val="accent1"/>
+          </a:effectRef>
+          <a:fontRef idx="minor">
+            <a:schemeClr val="lt1"/>
+          </a:fontRef>
+        </p:style>
+        <p:txBody>
+          <a:bodyPr rtlCol="0" anchor="ctr"/>
+          <a:lstStyle/>
+          <a:p>
+            <a:pPr algn="ctr"/>
+            <a:r>
+              <a:rPr lang="pt-BR" sz="1200" dirty="0" err="1">
+                <a:solidFill>
+                  <a:schemeClr val="tx1"/>
+                </a:solidFill>
+              </a:rPr>
+              <a:t>TimeOut</a:t>
+            </a:r>
+            <a:endParaRPr lang="pt-BR" sz="1200" dirty="0">
+              <a:solidFill>
+                <a:schemeClr val="tx1"/>
+              </a:solidFill>
+            </a:endParaRPr>
+          </a:p>
+        </p:txBody>
+      </p:sp>
+      <p:sp>
+        <p:nvSpPr>
+          <p:cNvPr id="40" name="Retângulo 39">
+            <a:extLst>
+              <a:ext uri="{FF2B5EF4-FFF2-40B4-BE49-F238E27FC236}">
+                <a16:creationId xmlns:a16="http://schemas.microsoft.com/office/drawing/2014/main" id="{7A56B5C7-55F6-4496-B11B-9218DAF0B101}"/>
+              </a:ext>
+            </a:extLst>
+          </p:cNvPr>
+          <p:cNvSpPr/>
+          <p:nvPr/>
+        </p:nvSpPr>
+        <p:spPr>
+          <a:xfrm>
+            <a:off x="1920118" y="2879395"/>
             <a:ext cx="2705100" cy="2005235"/>
           </a:xfrm>
           <a:prstGeom prst="rect">
@@ -5000,7 +5093,7 @@
             </a:r>
             <a:r>
               <a:rPr lang="pt-BR" sz="1200" dirty="0" err="1"/>
-              <a:t>onTimeOut</a:t>
+              <a:t>onError</a:t>
             </a:r>
             <a:r>
               <a:rPr lang="pt-BR" sz="1200" dirty="0"/>
@@ -5020,10 +5113,10 @@
       </p:sp>
       <p:sp>
         <p:nvSpPr>
-          <p:cNvPr id="34" name="Retângulo 33">
-            <a:extLst>
-              <a:ext uri="{FF2B5EF4-FFF2-40B4-BE49-F238E27FC236}">
-                <a16:creationId xmlns:a16="http://schemas.microsoft.com/office/drawing/2014/main" id="{B952915C-D43F-4F3C-92D5-AEDFC39CEC42}"/>
+          <p:cNvPr id="41" name="Retângulo 40">
+            <a:extLst>
+              <a:ext uri="{FF2B5EF4-FFF2-40B4-BE49-F238E27FC236}">
+                <a16:creationId xmlns:a16="http://schemas.microsoft.com/office/drawing/2014/main" id="{97F24794-70A8-4300-B799-E5E548A90395}"/>
               </a:ext>
             </a:extLst>
           </p:cNvPr>
@@ -5032,7 +5125,7 @@
         </p:nvSpPr>
         <p:spPr>
           <a:xfrm>
-            <a:off x="1981374" y="3194186"/>
+            <a:off x="1986967" y="3192491"/>
             <a:ext cx="2559494" cy="291960"/>
           </a:xfrm>
           <a:prstGeom prst="rect">
@@ -5084,10 +5177,10 @@
       </p:sp>
       <p:sp>
         <p:nvSpPr>
-          <p:cNvPr id="35" name="Retângulo 34">
-            <a:extLst>
-              <a:ext uri="{FF2B5EF4-FFF2-40B4-BE49-F238E27FC236}">
-                <a16:creationId xmlns:a16="http://schemas.microsoft.com/office/drawing/2014/main" id="{E3BA05A8-C98F-406C-A421-973BA951A4E9}"/>
+          <p:cNvPr id="42" name="Retângulo 41">
+            <a:extLst>
+              <a:ext uri="{FF2B5EF4-FFF2-40B4-BE49-F238E27FC236}">
+                <a16:creationId xmlns:a16="http://schemas.microsoft.com/office/drawing/2014/main" id="{92610581-EE1B-408C-ADC8-F716DF7913ED}"/>
               </a:ext>
             </a:extLst>
           </p:cNvPr>
@@ -5096,7 +5189,7 @@
         </p:nvSpPr>
         <p:spPr>
           <a:xfrm>
-            <a:off x="1981374" y="4176545"/>
+            <a:off x="1986967" y="4174850"/>
             <a:ext cx="2559495" cy="278193"/>
           </a:xfrm>
           <a:prstGeom prst="rect">
@@ -5159,10 +5252,10 @@
       </p:sp>
       <p:sp>
         <p:nvSpPr>
-          <p:cNvPr id="36" name="Retângulo 35">
-            <a:extLst>
-              <a:ext uri="{FF2B5EF4-FFF2-40B4-BE49-F238E27FC236}">
-                <a16:creationId xmlns:a16="http://schemas.microsoft.com/office/drawing/2014/main" id="{0612579C-5441-4EEA-8D4D-ACD3DD9EE136}"/>
+          <p:cNvPr id="43" name="Retângulo 42">
+            <a:extLst>
+              <a:ext uri="{FF2B5EF4-FFF2-40B4-BE49-F238E27FC236}">
+                <a16:creationId xmlns:a16="http://schemas.microsoft.com/office/drawing/2014/main" id="{857141F5-81BF-42C9-90E7-0470B6DA17BC}"/>
               </a:ext>
             </a:extLst>
           </p:cNvPr>
@@ -5171,7 +5264,7 @@
         </p:nvSpPr>
         <p:spPr>
           <a:xfrm>
-            <a:off x="1981374" y="4498170"/>
+            <a:off x="1986967" y="4496475"/>
             <a:ext cx="2559494" cy="288968"/>
           </a:xfrm>
           <a:prstGeom prst="rect">
@@ -5229,10 +5322,10 @@
       </p:sp>
       <p:sp>
         <p:nvSpPr>
-          <p:cNvPr id="37" name="Retângulo 36">
-            <a:extLst>
-              <a:ext uri="{FF2B5EF4-FFF2-40B4-BE49-F238E27FC236}">
-                <a16:creationId xmlns:a16="http://schemas.microsoft.com/office/drawing/2014/main" id="{B6ABFD43-49F4-48F5-A3BA-38EBB1F0671E}"/>
+          <p:cNvPr id="44" name="Retângulo 43">
+            <a:extLst>
+              <a:ext uri="{FF2B5EF4-FFF2-40B4-BE49-F238E27FC236}">
+                <a16:creationId xmlns:a16="http://schemas.microsoft.com/office/drawing/2014/main" id="{CF7E0130-02FC-41B3-84B5-4EFFE3E29AC2}"/>
               </a:ext>
             </a:extLst>
           </p:cNvPr>
@@ -5241,7 +5334,7 @@
         </p:nvSpPr>
         <p:spPr>
           <a:xfrm>
-            <a:off x="1981374" y="3510838"/>
+            <a:off x="1986967" y="3509143"/>
             <a:ext cx="2559495" cy="291960"/>
           </a:xfrm>
           <a:prstGeom prst="rect">
@@ -5290,10 +5383,10 @@
       </p:sp>
       <p:sp>
         <p:nvSpPr>
-          <p:cNvPr id="38" name="Retângulo 37">
-            <a:extLst>
-              <a:ext uri="{FF2B5EF4-FFF2-40B4-BE49-F238E27FC236}">
-                <a16:creationId xmlns:a16="http://schemas.microsoft.com/office/drawing/2014/main" id="{CEECDE03-0116-43AB-8688-2A3BA6FF166A}"/>
+          <p:cNvPr id="45" name="Retângulo 44">
+            <a:extLst>
+              <a:ext uri="{FF2B5EF4-FFF2-40B4-BE49-F238E27FC236}">
+                <a16:creationId xmlns:a16="http://schemas.microsoft.com/office/drawing/2014/main" id="{CA3A954A-732D-47FA-A81F-BE0E8F862BD6}"/>
               </a:ext>
             </a:extLst>
           </p:cNvPr>
@@ -5302,7 +5395,7 @@
         </p:nvSpPr>
         <p:spPr>
           <a:xfrm>
-            <a:off x="1981374" y="3841153"/>
+            <a:off x="1986967" y="3839458"/>
             <a:ext cx="2559494" cy="291960"/>
           </a:xfrm>
           <a:prstGeom prst="rect">
@@ -5351,10 +5444,10 @@
       </p:sp>
       <p:sp>
         <p:nvSpPr>
-          <p:cNvPr id="39" name="Seta: para a Direita 38">
-            <a:extLst>
-              <a:ext uri="{FF2B5EF4-FFF2-40B4-BE49-F238E27FC236}">
-                <a16:creationId xmlns:a16="http://schemas.microsoft.com/office/drawing/2014/main" id="{2D78E91D-1B7A-4ADA-A362-0428D41AC520}"/>
+          <p:cNvPr id="46" name="Retângulo 45">
+            <a:extLst>
+              <a:ext uri="{FF2B5EF4-FFF2-40B4-BE49-F238E27FC236}">
+                <a16:creationId xmlns:a16="http://schemas.microsoft.com/office/drawing/2014/main" id="{36AF7CDF-50DF-488C-B309-BBA0A6F04162}"/>
               </a:ext>
             </a:extLst>
           </p:cNvPr>
@@ -5363,10 +5456,222 @@
         </p:nvSpPr>
         <p:spPr>
           <a:xfrm>
-            <a:off x="436687" y="3363286"/>
-            <a:ext cx="1107347" cy="436228"/>
-          </a:xfrm>
-          <a:prstGeom prst="rightArrow">
+            <a:off x="7253651" y="2879395"/>
+            <a:ext cx="2705100" cy="2149805"/>
+          </a:xfrm>
+          <a:prstGeom prst="rect">
+            <a:avLst/>
+          </a:prstGeom>
+          <a:solidFill>
+            <a:schemeClr val="accent2"/>
+          </a:solidFill>
+          <a:ln>
+            <a:solidFill>
+              <a:schemeClr val="tx1"/>
+            </a:solidFill>
+          </a:ln>
+        </p:spPr>
+        <p:style>
+          <a:lnRef idx="2">
+            <a:schemeClr val="accent1">
+              <a:shade val="50000"/>
+            </a:schemeClr>
+          </a:lnRef>
+          <a:fillRef idx="1">
+            <a:schemeClr val="accent1"/>
+          </a:fillRef>
+          <a:effectRef idx="0">
+            <a:schemeClr val="accent1"/>
+          </a:effectRef>
+          <a:fontRef idx="minor">
+            <a:schemeClr val="lt1"/>
+          </a:fontRef>
+        </p:style>
+        <p:txBody>
+          <a:bodyPr rtlCol="0" anchor="t"/>
+          <a:lstStyle/>
+          <a:p>
+            <a:r>
+              <a:rPr lang="pt-BR" sz="1200" dirty="0"/>
+              <a:t>-&gt; </a:t>
+            </a:r>
+            <a:r>
+              <a:rPr lang="pt-BR" sz="1200" dirty="0" err="1"/>
+              <a:t>onSuccess</a:t>
+            </a:r>
+            <a:r>
+              <a:rPr lang="pt-BR" sz="1200" dirty="0"/>
+              <a:t>(</a:t>
+            </a:r>
+            <a:r>
+              <a:rPr lang="pt-BR" sz="1200" dirty="0" err="1"/>
+              <a:t>keyMessage</a:t>
+            </a:r>
+            <a:r>
+              <a:rPr lang="pt-BR" sz="1200" dirty="0"/>
+              <a:t>)</a:t>
+            </a:r>
+            <a:endParaRPr lang="pt-BR" dirty="0"/>
+          </a:p>
+        </p:txBody>
+      </p:sp>
+      <p:sp>
+        <p:nvSpPr>
+          <p:cNvPr id="47" name="Retângulo 46">
+            <a:extLst>
+              <a:ext uri="{FF2B5EF4-FFF2-40B4-BE49-F238E27FC236}">
+                <a16:creationId xmlns:a16="http://schemas.microsoft.com/office/drawing/2014/main" id="{182A9E16-1799-44BF-8634-0012A9380FFE}"/>
+              </a:ext>
+            </a:extLst>
+          </p:cNvPr>
+          <p:cNvSpPr/>
+          <p:nvPr/>
+        </p:nvSpPr>
+        <p:spPr>
+          <a:xfrm>
+            <a:off x="7320500" y="3192491"/>
+            <a:ext cx="2559494" cy="291960"/>
+          </a:xfrm>
+          <a:prstGeom prst="rect">
+            <a:avLst/>
+          </a:prstGeom>
+          <a:solidFill>
+            <a:schemeClr val="accent4">
+              <a:lumMod val="75000"/>
+            </a:schemeClr>
+          </a:solidFill>
+          <a:ln>
+            <a:solidFill>
+              <a:schemeClr val="tx1"/>
+            </a:solidFill>
+          </a:ln>
+        </p:spPr>
+        <p:style>
+          <a:lnRef idx="2">
+            <a:schemeClr val="accent1">
+              <a:shade val="50000"/>
+            </a:schemeClr>
+          </a:lnRef>
+          <a:fillRef idx="1">
+            <a:schemeClr val="accent1"/>
+          </a:fillRef>
+          <a:effectRef idx="0">
+            <a:schemeClr val="accent1"/>
+          </a:effectRef>
+          <a:fontRef idx="minor">
+            <a:schemeClr val="lt1"/>
+          </a:fontRef>
+        </p:style>
+        <p:txBody>
+          <a:bodyPr rtlCol="0" anchor="ctr"/>
+          <a:lstStyle/>
+          <a:p>
+            <a:pPr algn="ctr"/>
+            <a:r>
+              <a:rPr lang="pt-BR" sz="1200" dirty="0" err="1"/>
+              <a:t>moveDone</a:t>
+            </a:r>
+            <a:r>
+              <a:rPr lang="pt-BR" sz="1200" dirty="0"/>
+              <a:t>()</a:t>
+            </a:r>
+            <a:endParaRPr lang="pt-BR" dirty="0"/>
+          </a:p>
+        </p:txBody>
+      </p:sp>
+      <p:sp>
+        <p:nvSpPr>
+          <p:cNvPr id="48" name="Retângulo 47">
+            <a:extLst>
+              <a:ext uri="{FF2B5EF4-FFF2-40B4-BE49-F238E27FC236}">
+                <a16:creationId xmlns:a16="http://schemas.microsoft.com/office/drawing/2014/main" id="{F43F4D28-B637-432D-963A-BE877FB13A48}"/>
+              </a:ext>
+            </a:extLst>
+          </p:cNvPr>
+          <p:cNvSpPr/>
+          <p:nvPr/>
+        </p:nvSpPr>
+        <p:spPr>
+          <a:xfrm>
+            <a:off x="7313399" y="4292259"/>
+            <a:ext cx="2559495" cy="278193"/>
+          </a:xfrm>
+          <a:prstGeom prst="rect">
+            <a:avLst/>
+          </a:prstGeom>
+          <a:solidFill>
+            <a:schemeClr val="accent6">
+              <a:lumMod val="50000"/>
+            </a:schemeClr>
+          </a:solidFill>
+          <a:ln>
+            <a:solidFill>
+              <a:schemeClr val="tx1"/>
+            </a:solidFill>
+          </a:ln>
+        </p:spPr>
+        <p:style>
+          <a:lnRef idx="2">
+            <a:schemeClr val="accent1">
+              <a:shade val="50000"/>
+            </a:schemeClr>
+          </a:lnRef>
+          <a:fillRef idx="1">
+            <a:schemeClr val="accent1"/>
+          </a:fillRef>
+          <a:effectRef idx="0">
+            <a:schemeClr val="accent1"/>
+          </a:effectRef>
+          <a:fontRef idx="minor">
+            <a:schemeClr val="lt1"/>
+          </a:fontRef>
+        </p:style>
+        <p:txBody>
+          <a:bodyPr rtlCol="0" anchor="t"/>
+          <a:lstStyle/>
+          <a:p>
+            <a:r>
+              <a:rPr lang="pt-BR" sz="1200" dirty="0"/>
+              <a:t>Delete </a:t>
+            </a:r>
+            <a:r>
+              <a:rPr lang="pt-BR" sz="1200" dirty="0" err="1"/>
+              <a:t>virtualQueue</a:t>
+            </a:r>
+            <a:r>
+              <a:rPr lang="pt-BR" sz="1200" dirty="0"/>
+              <a:t>(</a:t>
+            </a:r>
+            <a:r>
+              <a:rPr lang="pt-BR" sz="1200" dirty="0" err="1"/>
+              <a:t>keyMessage</a:t>
+            </a:r>
+            <a:r>
+              <a:rPr lang="pt-BR" sz="1200" dirty="0"/>
+              <a:t>)</a:t>
+            </a:r>
+            <a:endParaRPr lang="pt-BR" u="sng" dirty="0"/>
+          </a:p>
+        </p:txBody>
+      </p:sp>
+      <p:sp>
+        <p:nvSpPr>
+          <p:cNvPr id="49" name="Retângulo 48">
+            <a:extLst>
+              <a:ext uri="{FF2B5EF4-FFF2-40B4-BE49-F238E27FC236}">
+                <a16:creationId xmlns:a16="http://schemas.microsoft.com/office/drawing/2014/main" id="{85FD20C8-51AE-48F6-8D0E-F3C903B3E093}"/>
+              </a:ext>
+            </a:extLst>
+          </p:cNvPr>
+          <p:cNvSpPr/>
+          <p:nvPr/>
+        </p:nvSpPr>
+        <p:spPr>
+          <a:xfrm>
+            <a:off x="7313399" y="4647997"/>
+            <a:ext cx="2559494" cy="288968"/>
+          </a:xfrm>
+          <a:prstGeom prst="rect">
             <a:avLst/>
           </a:prstGeom>
           <a:ln>
@@ -5395,12 +5700,287 @@
           <a:bodyPr rtlCol="0" anchor="ctr"/>
           <a:lstStyle/>
           <a:p>
+            <a:r>
+              <a:rPr lang="pt-BR" sz="1200" dirty="0"/>
+              <a:t>Delete </a:t>
+            </a:r>
+            <a:r>
+              <a:rPr lang="pt-BR" sz="1200" dirty="0" err="1"/>
+              <a:t>messageProccess</a:t>
+            </a:r>
+            <a:r>
+              <a:rPr lang="pt-BR" sz="1200" dirty="0"/>
+              <a:t>(</a:t>
+            </a:r>
+            <a:r>
+              <a:rPr lang="pt-BR" sz="1200" dirty="0" err="1"/>
+              <a:t>keyMessage</a:t>
+            </a:r>
+            <a:r>
+              <a:rPr lang="pt-BR" sz="1200" dirty="0"/>
+              <a:t>)</a:t>
+            </a:r>
+            <a:endParaRPr lang="pt-BR" sz="1200" u="sng" dirty="0"/>
+          </a:p>
+        </p:txBody>
+      </p:sp>
+      <p:sp>
+        <p:nvSpPr>
+          <p:cNvPr id="50" name="Retângulo 49">
+            <a:extLst>
+              <a:ext uri="{FF2B5EF4-FFF2-40B4-BE49-F238E27FC236}">
+                <a16:creationId xmlns:a16="http://schemas.microsoft.com/office/drawing/2014/main" id="{B1BD0336-E8B6-478D-9725-0424F920373E}"/>
+              </a:ext>
+            </a:extLst>
+          </p:cNvPr>
+          <p:cNvSpPr/>
+          <p:nvPr/>
+        </p:nvSpPr>
+        <p:spPr>
+          <a:xfrm>
+            <a:off x="7313400" y="3922754"/>
+            <a:ext cx="2559495" cy="291960"/>
+          </a:xfrm>
+          <a:prstGeom prst="rect">
+            <a:avLst/>
+          </a:prstGeom>
+          <a:solidFill>
+            <a:schemeClr val="accent2"/>
+          </a:solidFill>
+          <a:ln>
+            <a:solidFill>
+              <a:schemeClr val="tx1"/>
+            </a:solidFill>
+          </a:ln>
+        </p:spPr>
+        <p:style>
+          <a:lnRef idx="2">
+            <a:schemeClr val="accent1">
+              <a:shade val="50000"/>
+            </a:schemeClr>
+          </a:lnRef>
+          <a:fillRef idx="1">
+            <a:schemeClr val="accent1"/>
+          </a:fillRef>
+          <a:effectRef idx="0">
+            <a:schemeClr val="accent1"/>
+          </a:effectRef>
+          <a:fontRef idx="minor">
+            <a:schemeClr val="lt1"/>
+          </a:fontRef>
+        </p:style>
+        <p:txBody>
+          <a:bodyPr rtlCol="0" anchor="t"/>
+          <a:lstStyle/>
+          <a:p>
+            <a:r>
+              <a:rPr lang="pt-BR" sz="1200" dirty="0" err="1"/>
+              <a:t>setInProccessNodeOut</a:t>
+            </a:r>
+            <a:r>
+              <a:rPr lang="pt-BR" sz="1200" dirty="0"/>
+              <a:t>(False)</a:t>
+            </a:r>
+            <a:endParaRPr lang="pt-BR" dirty="0"/>
+          </a:p>
+        </p:txBody>
+      </p:sp>
+      <p:sp>
+        <p:nvSpPr>
+          <p:cNvPr id="51" name="Retângulo 50">
+            <a:extLst>
+              <a:ext uri="{FF2B5EF4-FFF2-40B4-BE49-F238E27FC236}">
+                <a16:creationId xmlns:a16="http://schemas.microsoft.com/office/drawing/2014/main" id="{08DB7F6A-E5A9-4B15-9389-B7867565D20F}"/>
+              </a:ext>
+            </a:extLst>
+          </p:cNvPr>
+          <p:cNvSpPr/>
+          <p:nvPr/>
+        </p:nvSpPr>
+        <p:spPr>
+          <a:xfrm>
+            <a:off x="7313401" y="3553249"/>
+            <a:ext cx="2559494" cy="291960"/>
+          </a:xfrm>
+          <a:prstGeom prst="rect">
+            <a:avLst/>
+          </a:prstGeom>
+          <a:solidFill>
+            <a:schemeClr val="accent2"/>
+          </a:solidFill>
+          <a:ln>
+            <a:solidFill>
+              <a:schemeClr val="tx1"/>
+            </a:solidFill>
+          </a:ln>
+        </p:spPr>
+        <p:style>
+          <a:lnRef idx="2">
+            <a:schemeClr val="accent1">
+              <a:shade val="50000"/>
+            </a:schemeClr>
+          </a:lnRef>
+          <a:fillRef idx="1">
+            <a:schemeClr val="accent1"/>
+          </a:fillRef>
+          <a:effectRef idx="0">
+            <a:schemeClr val="accent1"/>
+          </a:effectRef>
+          <a:fontRef idx="minor">
+            <a:schemeClr val="lt1"/>
+          </a:fontRef>
+        </p:style>
+        <p:txBody>
+          <a:bodyPr rtlCol="0" anchor="t"/>
+          <a:lstStyle/>
+          <a:p>
+            <a:r>
+              <a:rPr lang="pt-BR" sz="1200" dirty="0" err="1"/>
+              <a:t>setTimeOut</a:t>
+            </a:r>
+            <a:r>
+              <a:rPr lang="pt-BR" sz="1200" dirty="0"/>
+              <a:t>(false)</a:t>
+            </a:r>
+            <a:endParaRPr lang="pt-BR" dirty="0"/>
+          </a:p>
+        </p:txBody>
+      </p:sp>
+      <p:sp>
+        <p:nvSpPr>
+          <p:cNvPr id="52" name="Seta: para a Direita 51">
+            <a:extLst>
+              <a:ext uri="{FF2B5EF4-FFF2-40B4-BE49-F238E27FC236}">
+                <a16:creationId xmlns:a16="http://schemas.microsoft.com/office/drawing/2014/main" id="{B1473ADF-DEFB-4D7B-A1E3-0D90BE86A818}"/>
+              </a:ext>
+            </a:extLst>
+          </p:cNvPr>
+          <p:cNvSpPr/>
+          <p:nvPr/>
+        </p:nvSpPr>
+        <p:spPr>
+          <a:xfrm>
+            <a:off x="6042863" y="3623056"/>
+            <a:ext cx="1107347" cy="436228"/>
+          </a:xfrm>
+          <a:prstGeom prst="rightArrow">
+            <a:avLst/>
+          </a:prstGeom>
+          <a:solidFill>
+            <a:srgbClr val="FFFF00"/>
+          </a:solidFill>
+          <a:ln>
+            <a:solidFill>
+              <a:schemeClr val="tx1"/>
+            </a:solidFill>
+          </a:ln>
+        </p:spPr>
+        <p:style>
+          <a:lnRef idx="2">
+            <a:schemeClr val="accent1">
+              <a:shade val="50000"/>
+            </a:schemeClr>
+          </a:lnRef>
+          <a:fillRef idx="1">
+            <a:schemeClr val="accent1"/>
+          </a:fillRef>
+          <a:effectRef idx="0">
+            <a:schemeClr val="accent1"/>
+          </a:effectRef>
+          <a:fontRef idx="minor">
+            <a:schemeClr val="lt1"/>
+          </a:fontRef>
+        </p:style>
+        <p:txBody>
+          <a:bodyPr rtlCol="0" anchor="ctr"/>
+          <a:lstStyle/>
+          <a:p>
             <a:pPr algn="ctr"/>
             <a:r>
+              <a:rPr lang="pt-BR" sz="1200" dirty="0">
+                <a:solidFill>
+                  <a:schemeClr val="tx1"/>
+                </a:solidFill>
+              </a:rPr>
+              <a:t>ACK </a:t>
+            </a:r>
+            <a:r>
+              <a:rPr lang="pt-BR" sz="1200" dirty="0" err="1">
+                <a:solidFill>
+                  <a:schemeClr val="tx1"/>
+                </a:solidFill>
+              </a:rPr>
+              <a:t>Success</a:t>
+            </a:r>
+            <a:endParaRPr lang="pt-BR" sz="1200" dirty="0">
+              <a:solidFill>
+                <a:schemeClr val="tx1"/>
+              </a:solidFill>
+            </a:endParaRPr>
+          </a:p>
+        </p:txBody>
+      </p:sp>
+      <p:sp>
+        <p:nvSpPr>
+          <p:cNvPr id="54" name="Retângulo 53">
+            <a:extLst>
+              <a:ext uri="{FF2B5EF4-FFF2-40B4-BE49-F238E27FC236}">
+                <a16:creationId xmlns:a16="http://schemas.microsoft.com/office/drawing/2014/main" id="{E9C8E11B-340A-4A34-8B50-0F1D5B7DBF5F}"/>
+              </a:ext>
+            </a:extLst>
+          </p:cNvPr>
+          <p:cNvSpPr/>
+          <p:nvPr/>
+        </p:nvSpPr>
+        <p:spPr>
+          <a:xfrm>
+            <a:off x="7424105" y="2054202"/>
+            <a:ext cx="2405695" cy="291960"/>
+          </a:xfrm>
+          <a:prstGeom prst="rect">
+            <a:avLst/>
+          </a:prstGeom>
+          <a:solidFill>
+            <a:schemeClr val="accent4">
+              <a:lumMod val="75000"/>
+            </a:schemeClr>
+          </a:solidFill>
+          <a:ln>
+            <a:solidFill>
+              <a:schemeClr val="tx1"/>
+            </a:solidFill>
+          </a:ln>
+        </p:spPr>
+        <p:style>
+          <a:lnRef idx="2">
+            <a:schemeClr val="accent1">
+              <a:shade val="50000"/>
+            </a:schemeClr>
+          </a:lnRef>
+          <a:fillRef idx="1">
+            <a:schemeClr val="accent1"/>
+          </a:fillRef>
+          <a:effectRef idx="0">
+            <a:schemeClr val="accent1"/>
+          </a:effectRef>
+          <a:fontRef idx="minor">
+            <a:schemeClr val="lt1"/>
+          </a:fontRef>
+        </p:style>
+        <p:txBody>
+          <a:bodyPr rtlCol="0" anchor="ctr"/>
+          <a:lstStyle/>
+          <a:p>
+            <a:pPr algn="ctr"/>
+            <a:r>
               <a:rPr lang="pt-BR" sz="1200" dirty="0" err="1"/>
-              <a:t>TimeOut</a:t>
-            </a:r>
-            <a:endParaRPr lang="pt-BR" sz="1200" dirty="0"/>
+              <a:t>getMessage</a:t>
+            </a:r>
+            <a:r>
+              <a:rPr lang="pt-BR" sz="1200" dirty="0"/>
+              <a:t>()</a:t>
+            </a:r>
+            <a:endParaRPr lang="pt-BR" dirty="0"/>
           </a:p>
         </p:txBody>
       </p:sp>
@@ -5408,6 +5988,1063 @@
     <p:extLst>
       <p:ext uri="{BB962C8B-B14F-4D97-AF65-F5344CB8AC3E}">
         <p14:creationId xmlns:p14="http://schemas.microsoft.com/office/powerpoint/2010/main" val="2913117213"/>
+      </p:ext>
+    </p:extLst>
+  </p:cSld>
+  <p:clrMapOvr>
+    <a:masterClrMapping/>
+  </p:clrMapOvr>
+</p:sld>
+</file>
+
+<file path=ppt/slides/slide2.xml><?xml version="1.0" encoding="utf-8"?>
+<p:sld xmlns:a="http://schemas.openxmlformats.org/drawingml/2006/main" xmlns:r="http://schemas.openxmlformats.org/officeDocument/2006/relationships" xmlns:p="http://schemas.openxmlformats.org/presentationml/2006/main">
+  <p:cSld>
+    <p:spTree>
+      <p:nvGrpSpPr>
+        <p:cNvPr id="1" name=""/>
+        <p:cNvGrpSpPr/>
+        <p:nvPr/>
+      </p:nvGrpSpPr>
+      <p:grpSpPr>
+        <a:xfrm>
+          <a:off x="0" y="0"/>
+          <a:ext cx="0" cy="0"/>
+          <a:chOff x="0" y="0"/>
+          <a:chExt cx="0" cy="0"/>
+        </a:xfrm>
+      </p:grpSpPr>
+      <p:sp>
+        <p:nvSpPr>
+          <p:cNvPr id="4" name="Seta: para a Direita 3">
+            <a:extLst>
+              <a:ext uri="{FF2B5EF4-FFF2-40B4-BE49-F238E27FC236}">
+                <a16:creationId xmlns:a16="http://schemas.microsoft.com/office/drawing/2014/main" id="{0F81A8D5-18E1-4514-A72B-238C6070AEB6}"/>
+              </a:ext>
+            </a:extLst>
+          </p:cNvPr>
+          <p:cNvSpPr/>
+          <p:nvPr/>
+        </p:nvSpPr>
+        <p:spPr>
+          <a:xfrm>
+            <a:off x="284287" y="234102"/>
+            <a:ext cx="1107347" cy="436228"/>
+          </a:xfrm>
+          <a:prstGeom prst="rightArrow">
+            <a:avLst/>
+          </a:prstGeom>
+          <a:solidFill>
+            <a:srgbClr val="FFFF00"/>
+          </a:solidFill>
+          <a:ln>
+            <a:solidFill>
+              <a:schemeClr val="tx1"/>
+            </a:solidFill>
+          </a:ln>
+        </p:spPr>
+        <p:style>
+          <a:lnRef idx="2">
+            <a:schemeClr val="accent1">
+              <a:shade val="50000"/>
+            </a:schemeClr>
+          </a:lnRef>
+          <a:fillRef idx="1">
+            <a:schemeClr val="accent1"/>
+          </a:fillRef>
+          <a:effectRef idx="0">
+            <a:schemeClr val="accent1"/>
+          </a:effectRef>
+          <a:fontRef idx="minor">
+            <a:schemeClr val="lt1"/>
+          </a:fontRef>
+        </p:style>
+        <p:txBody>
+          <a:bodyPr rtlCol="0" anchor="ctr"/>
+          <a:lstStyle/>
+          <a:p>
+            <a:pPr algn="ctr"/>
+            <a:r>
+              <a:rPr lang="pt-BR" sz="1200" dirty="0" err="1">
+                <a:solidFill>
+                  <a:schemeClr val="tx1"/>
+                </a:solidFill>
+              </a:rPr>
+              <a:t>init</a:t>
+            </a:r>
+            <a:endParaRPr lang="pt-BR" sz="1200" dirty="0">
+              <a:solidFill>
+                <a:schemeClr val="tx1"/>
+              </a:solidFill>
+            </a:endParaRPr>
+          </a:p>
+        </p:txBody>
+      </p:sp>
+      <p:sp>
+        <p:nvSpPr>
+          <p:cNvPr id="7" name="Retângulo 6">
+            <a:extLst>
+              <a:ext uri="{FF2B5EF4-FFF2-40B4-BE49-F238E27FC236}">
+                <a16:creationId xmlns:a16="http://schemas.microsoft.com/office/drawing/2014/main" id="{12789A1B-7D5F-4EB0-85B5-DCE0F714144A}"/>
+              </a:ext>
+            </a:extLst>
+          </p:cNvPr>
+          <p:cNvSpPr/>
+          <p:nvPr/>
+        </p:nvSpPr>
+        <p:spPr>
+          <a:xfrm>
+            <a:off x="118495" y="6194055"/>
+            <a:ext cx="1979801" cy="503339"/>
+          </a:xfrm>
+          <a:prstGeom prst="rect">
+            <a:avLst/>
+          </a:prstGeom>
+          <a:ln>
+            <a:solidFill>
+              <a:schemeClr val="tx1"/>
+            </a:solidFill>
+          </a:ln>
+        </p:spPr>
+        <p:style>
+          <a:lnRef idx="2">
+            <a:schemeClr val="accent1">
+              <a:shade val="50000"/>
+            </a:schemeClr>
+          </a:lnRef>
+          <a:fillRef idx="1">
+            <a:schemeClr val="accent1"/>
+          </a:fillRef>
+          <a:effectRef idx="0">
+            <a:schemeClr val="accent1"/>
+          </a:effectRef>
+          <a:fontRef idx="minor">
+            <a:schemeClr val="lt1"/>
+          </a:fontRef>
+        </p:style>
+        <p:txBody>
+          <a:bodyPr rtlCol="0" anchor="ctr"/>
+          <a:lstStyle/>
+          <a:p>
+            <a:pPr algn="ctr"/>
+            <a:r>
+              <a:rPr lang="pt-BR" dirty="0" err="1"/>
+              <a:t>messageProccess</a:t>
+            </a:r>
+            <a:endParaRPr lang="pt-BR" dirty="0"/>
+          </a:p>
+        </p:txBody>
+      </p:sp>
+      <p:sp>
+        <p:nvSpPr>
+          <p:cNvPr id="8" name="Retângulo 7">
+            <a:extLst>
+              <a:ext uri="{FF2B5EF4-FFF2-40B4-BE49-F238E27FC236}">
+                <a16:creationId xmlns:a16="http://schemas.microsoft.com/office/drawing/2014/main" id="{F7E4325F-26B7-476A-BF34-220733DF9C90}"/>
+              </a:ext>
+            </a:extLst>
+          </p:cNvPr>
+          <p:cNvSpPr/>
+          <p:nvPr/>
+        </p:nvSpPr>
+        <p:spPr>
+          <a:xfrm>
+            <a:off x="4279435" y="6194055"/>
+            <a:ext cx="1979801" cy="503339"/>
+          </a:xfrm>
+          <a:prstGeom prst="rect">
+            <a:avLst/>
+          </a:prstGeom>
+          <a:solidFill>
+            <a:schemeClr val="accent6">
+              <a:lumMod val="50000"/>
+            </a:schemeClr>
+          </a:solidFill>
+          <a:ln>
+            <a:solidFill>
+              <a:schemeClr val="tx1"/>
+            </a:solidFill>
+          </a:ln>
+        </p:spPr>
+        <p:style>
+          <a:lnRef idx="2">
+            <a:schemeClr val="accent1">
+              <a:shade val="50000"/>
+            </a:schemeClr>
+          </a:lnRef>
+          <a:fillRef idx="1">
+            <a:schemeClr val="accent1"/>
+          </a:fillRef>
+          <a:effectRef idx="0">
+            <a:schemeClr val="accent1"/>
+          </a:effectRef>
+          <a:fontRef idx="minor">
+            <a:schemeClr val="lt1"/>
+          </a:fontRef>
+        </p:style>
+        <p:txBody>
+          <a:bodyPr rtlCol="0" anchor="ctr"/>
+          <a:lstStyle/>
+          <a:p>
+            <a:pPr algn="ctr"/>
+            <a:r>
+              <a:rPr lang="pt-BR" dirty="0" err="1"/>
+              <a:t>virtualQueue</a:t>
+            </a:r>
+            <a:endParaRPr lang="pt-BR" dirty="0"/>
+          </a:p>
+        </p:txBody>
+      </p:sp>
+      <p:sp>
+        <p:nvSpPr>
+          <p:cNvPr id="10" name="Retângulo 9">
+            <a:extLst>
+              <a:ext uri="{FF2B5EF4-FFF2-40B4-BE49-F238E27FC236}">
+                <a16:creationId xmlns:a16="http://schemas.microsoft.com/office/drawing/2014/main" id="{8AA0A16D-D4EC-4EB4-A507-40393BA8EFF1}"/>
+              </a:ext>
+            </a:extLst>
+          </p:cNvPr>
+          <p:cNvSpPr/>
+          <p:nvPr/>
+        </p:nvSpPr>
+        <p:spPr>
+          <a:xfrm>
+            <a:off x="2198965" y="6194055"/>
+            <a:ext cx="1979801" cy="503339"/>
+          </a:xfrm>
+          <a:prstGeom prst="rect">
+            <a:avLst/>
+          </a:prstGeom>
+          <a:solidFill>
+            <a:schemeClr val="accent4">
+              <a:lumMod val="75000"/>
+            </a:schemeClr>
+          </a:solidFill>
+          <a:ln>
+            <a:solidFill>
+              <a:schemeClr val="tx1"/>
+            </a:solidFill>
+          </a:ln>
+        </p:spPr>
+        <p:style>
+          <a:lnRef idx="2">
+            <a:schemeClr val="accent1">
+              <a:shade val="50000"/>
+            </a:schemeClr>
+          </a:lnRef>
+          <a:fillRef idx="1">
+            <a:schemeClr val="accent1"/>
+          </a:fillRef>
+          <a:effectRef idx="0">
+            <a:schemeClr val="accent1"/>
+          </a:effectRef>
+          <a:fontRef idx="minor">
+            <a:schemeClr val="lt1"/>
+          </a:fontRef>
+        </p:style>
+        <p:txBody>
+          <a:bodyPr rtlCol="0" anchor="ctr"/>
+          <a:lstStyle/>
+          <a:p>
+            <a:pPr algn="ctr"/>
+            <a:r>
+              <a:rPr lang="pt-BR" dirty="0" err="1"/>
+              <a:t>FileSystem</a:t>
+            </a:r>
+            <a:endParaRPr lang="pt-BR" dirty="0"/>
+          </a:p>
+        </p:txBody>
+      </p:sp>
+      <p:sp>
+        <p:nvSpPr>
+          <p:cNvPr id="13" name="Retângulo 12">
+            <a:extLst>
+              <a:ext uri="{FF2B5EF4-FFF2-40B4-BE49-F238E27FC236}">
+                <a16:creationId xmlns:a16="http://schemas.microsoft.com/office/drawing/2014/main" id="{73A4B5F7-7022-472C-8732-432232AE0ABB}"/>
+              </a:ext>
+            </a:extLst>
+          </p:cNvPr>
+          <p:cNvSpPr/>
+          <p:nvPr/>
+        </p:nvSpPr>
+        <p:spPr>
+          <a:xfrm>
+            <a:off x="6359905" y="6189862"/>
+            <a:ext cx="1979801" cy="503339"/>
+          </a:xfrm>
+          <a:prstGeom prst="rect">
+            <a:avLst/>
+          </a:prstGeom>
+          <a:solidFill>
+            <a:schemeClr val="accent2"/>
+          </a:solidFill>
+          <a:ln>
+            <a:solidFill>
+              <a:schemeClr val="tx1"/>
+            </a:solidFill>
+          </a:ln>
+        </p:spPr>
+        <p:style>
+          <a:lnRef idx="2">
+            <a:schemeClr val="accent1">
+              <a:shade val="50000"/>
+            </a:schemeClr>
+          </a:lnRef>
+          <a:fillRef idx="1">
+            <a:schemeClr val="accent1"/>
+          </a:fillRef>
+          <a:effectRef idx="0">
+            <a:schemeClr val="accent1"/>
+          </a:effectRef>
+          <a:fontRef idx="minor">
+            <a:schemeClr val="lt1"/>
+          </a:fontRef>
+        </p:style>
+        <p:txBody>
+          <a:bodyPr rtlCol="0" anchor="ctr"/>
+          <a:lstStyle/>
+          <a:p>
+            <a:pPr algn="ctr"/>
+            <a:r>
+              <a:rPr lang="pt-BR" dirty="0" err="1"/>
+              <a:t>SafeQueue</a:t>
+            </a:r>
+            <a:endParaRPr lang="pt-BR" dirty="0"/>
+          </a:p>
+        </p:txBody>
+      </p:sp>
+      <p:sp>
+        <p:nvSpPr>
+          <p:cNvPr id="40" name="Retângulo 39">
+            <a:extLst>
+              <a:ext uri="{FF2B5EF4-FFF2-40B4-BE49-F238E27FC236}">
+                <a16:creationId xmlns:a16="http://schemas.microsoft.com/office/drawing/2014/main" id="{7A56B5C7-55F6-4496-B11B-9218DAF0B101}"/>
+              </a:ext>
+            </a:extLst>
+          </p:cNvPr>
+          <p:cNvSpPr/>
+          <p:nvPr/>
+        </p:nvSpPr>
+        <p:spPr>
+          <a:xfrm>
+            <a:off x="1595928" y="127301"/>
+            <a:ext cx="2705100" cy="780749"/>
+          </a:xfrm>
+          <a:prstGeom prst="rect">
+            <a:avLst/>
+          </a:prstGeom>
+          <a:solidFill>
+            <a:schemeClr val="accent2"/>
+          </a:solidFill>
+          <a:ln>
+            <a:solidFill>
+              <a:schemeClr val="tx1"/>
+            </a:solidFill>
+          </a:ln>
+        </p:spPr>
+        <p:style>
+          <a:lnRef idx="2">
+            <a:schemeClr val="accent1">
+              <a:shade val="50000"/>
+            </a:schemeClr>
+          </a:lnRef>
+          <a:fillRef idx="1">
+            <a:schemeClr val="accent1"/>
+          </a:fillRef>
+          <a:effectRef idx="0">
+            <a:schemeClr val="accent1"/>
+          </a:effectRef>
+          <a:fontRef idx="minor">
+            <a:schemeClr val="lt1"/>
+          </a:fontRef>
+        </p:style>
+        <p:txBody>
+          <a:bodyPr rtlCol="0" anchor="t"/>
+          <a:lstStyle/>
+          <a:p>
+            <a:endParaRPr lang="pt-BR" dirty="0"/>
+          </a:p>
+        </p:txBody>
+      </p:sp>
+      <p:sp>
+        <p:nvSpPr>
+          <p:cNvPr id="41" name="Retângulo 40">
+            <a:extLst>
+              <a:ext uri="{FF2B5EF4-FFF2-40B4-BE49-F238E27FC236}">
+                <a16:creationId xmlns:a16="http://schemas.microsoft.com/office/drawing/2014/main" id="{97F24794-70A8-4300-B799-E5E548A90395}"/>
+              </a:ext>
+            </a:extLst>
+          </p:cNvPr>
+          <p:cNvSpPr/>
+          <p:nvPr/>
+        </p:nvSpPr>
+        <p:spPr>
+          <a:xfrm>
+            <a:off x="1668730" y="204289"/>
+            <a:ext cx="2559494" cy="633912"/>
+          </a:xfrm>
+          <a:prstGeom prst="rect">
+            <a:avLst/>
+          </a:prstGeom>
+          <a:solidFill>
+            <a:schemeClr val="accent4">
+              <a:lumMod val="75000"/>
+            </a:schemeClr>
+          </a:solidFill>
+          <a:ln>
+            <a:solidFill>
+              <a:schemeClr val="tx1"/>
+            </a:solidFill>
+          </a:ln>
+        </p:spPr>
+        <p:style>
+          <a:lnRef idx="2">
+            <a:schemeClr val="accent1">
+              <a:shade val="50000"/>
+            </a:schemeClr>
+          </a:lnRef>
+          <a:fillRef idx="1">
+            <a:schemeClr val="accent1"/>
+          </a:fillRef>
+          <a:effectRef idx="0">
+            <a:schemeClr val="accent1"/>
+          </a:effectRef>
+          <a:fontRef idx="minor">
+            <a:schemeClr val="lt1"/>
+          </a:fontRef>
+        </p:style>
+        <p:txBody>
+          <a:bodyPr rtlCol="0" anchor="t"/>
+          <a:lstStyle/>
+          <a:p>
+            <a:pPr algn="ctr"/>
+            <a:r>
+              <a:rPr lang="pt-BR" sz="1200" dirty="0" err="1"/>
+              <a:t>init</a:t>
+            </a:r>
+            <a:r>
+              <a:rPr lang="pt-BR" sz="1200" dirty="0"/>
+              <a:t>()</a:t>
+            </a:r>
+            <a:endParaRPr lang="pt-BR" dirty="0"/>
+          </a:p>
+        </p:txBody>
+      </p:sp>
+      <p:sp>
+        <p:nvSpPr>
+          <p:cNvPr id="59" name="Retângulo 58">
+            <a:extLst>
+              <a:ext uri="{FF2B5EF4-FFF2-40B4-BE49-F238E27FC236}">
+                <a16:creationId xmlns:a16="http://schemas.microsoft.com/office/drawing/2014/main" id="{442AD40D-1E87-4924-98F0-E6880238048E}"/>
+              </a:ext>
+            </a:extLst>
+          </p:cNvPr>
+          <p:cNvSpPr/>
+          <p:nvPr/>
+        </p:nvSpPr>
+        <p:spPr>
+          <a:xfrm>
+            <a:off x="1714500" y="452216"/>
+            <a:ext cx="2464265" cy="291960"/>
+          </a:xfrm>
+          <a:prstGeom prst="rect">
+            <a:avLst/>
+          </a:prstGeom>
+          <a:solidFill>
+            <a:schemeClr val="accent2"/>
+          </a:solidFill>
+          <a:ln>
+            <a:solidFill>
+              <a:schemeClr val="tx1"/>
+            </a:solidFill>
+          </a:ln>
+        </p:spPr>
+        <p:style>
+          <a:lnRef idx="2">
+            <a:schemeClr val="accent1">
+              <a:shade val="50000"/>
+            </a:schemeClr>
+          </a:lnRef>
+          <a:fillRef idx="1">
+            <a:schemeClr val="accent1"/>
+          </a:fillRef>
+          <a:effectRef idx="0">
+            <a:schemeClr val="accent1"/>
+          </a:effectRef>
+          <a:fontRef idx="minor">
+            <a:schemeClr val="lt1"/>
+          </a:fontRef>
+        </p:style>
+        <p:txBody>
+          <a:bodyPr rtlCol="0" anchor="t"/>
+          <a:lstStyle/>
+          <a:p>
+            <a:pPr algn="ctr"/>
+            <a:r>
+              <a:rPr lang="pt-BR" sz="1200" dirty="0" err="1"/>
+              <a:t>startMessages</a:t>
+            </a:r>
+            <a:r>
+              <a:rPr lang="pt-BR" sz="1200" dirty="0"/>
+              <a:t>()</a:t>
+            </a:r>
+            <a:endParaRPr lang="pt-BR" dirty="0"/>
+          </a:p>
+        </p:txBody>
+      </p:sp>
+      <p:sp>
+        <p:nvSpPr>
+          <p:cNvPr id="60" name="Seta: para a Direita 59">
+            <a:extLst>
+              <a:ext uri="{FF2B5EF4-FFF2-40B4-BE49-F238E27FC236}">
+                <a16:creationId xmlns:a16="http://schemas.microsoft.com/office/drawing/2014/main" id="{D5DD6C08-49C7-48F2-A868-E45D9D749D06}"/>
+              </a:ext>
+            </a:extLst>
+          </p:cNvPr>
+          <p:cNvSpPr/>
+          <p:nvPr/>
+        </p:nvSpPr>
+        <p:spPr>
+          <a:xfrm>
+            <a:off x="284287" y="1155977"/>
+            <a:ext cx="1107347" cy="436228"/>
+          </a:xfrm>
+          <a:prstGeom prst="rightArrow">
+            <a:avLst/>
+          </a:prstGeom>
+          <a:solidFill>
+            <a:srgbClr val="FFFF00"/>
+          </a:solidFill>
+          <a:ln>
+            <a:solidFill>
+              <a:schemeClr val="tx1"/>
+            </a:solidFill>
+          </a:ln>
+        </p:spPr>
+        <p:style>
+          <a:lnRef idx="2">
+            <a:schemeClr val="accent1">
+              <a:shade val="50000"/>
+            </a:schemeClr>
+          </a:lnRef>
+          <a:fillRef idx="1">
+            <a:schemeClr val="accent1"/>
+          </a:fillRef>
+          <a:effectRef idx="0">
+            <a:schemeClr val="accent1"/>
+          </a:effectRef>
+          <a:fontRef idx="minor">
+            <a:schemeClr val="lt1"/>
+          </a:fontRef>
+        </p:style>
+        <p:txBody>
+          <a:bodyPr rtlCol="0" anchor="ctr"/>
+          <a:lstStyle/>
+          <a:p>
+            <a:pPr algn="ctr"/>
+            <a:r>
+              <a:rPr lang="pt-BR" sz="1200" dirty="0" err="1">
+                <a:solidFill>
+                  <a:schemeClr val="tx1"/>
+                </a:solidFill>
+              </a:rPr>
+              <a:t>deleteDone</a:t>
+            </a:r>
+            <a:endParaRPr lang="pt-BR" sz="1200" dirty="0">
+              <a:solidFill>
+                <a:schemeClr val="tx1"/>
+              </a:solidFill>
+            </a:endParaRPr>
+          </a:p>
+        </p:txBody>
+      </p:sp>
+      <p:sp>
+        <p:nvSpPr>
+          <p:cNvPr id="61" name="Retângulo 60">
+            <a:extLst>
+              <a:ext uri="{FF2B5EF4-FFF2-40B4-BE49-F238E27FC236}">
+                <a16:creationId xmlns:a16="http://schemas.microsoft.com/office/drawing/2014/main" id="{251A4AFC-EF70-436E-8DD6-ACB536025CAD}"/>
+              </a:ext>
+            </a:extLst>
+          </p:cNvPr>
+          <p:cNvSpPr/>
+          <p:nvPr/>
+        </p:nvSpPr>
+        <p:spPr>
+          <a:xfrm>
+            <a:off x="1595928" y="1155977"/>
+            <a:ext cx="2705100" cy="436228"/>
+          </a:xfrm>
+          <a:prstGeom prst="rect">
+            <a:avLst/>
+          </a:prstGeom>
+          <a:solidFill>
+            <a:schemeClr val="accent2"/>
+          </a:solidFill>
+          <a:ln>
+            <a:solidFill>
+              <a:schemeClr val="tx1"/>
+            </a:solidFill>
+          </a:ln>
+        </p:spPr>
+        <p:style>
+          <a:lnRef idx="2">
+            <a:schemeClr val="accent1">
+              <a:shade val="50000"/>
+            </a:schemeClr>
+          </a:lnRef>
+          <a:fillRef idx="1">
+            <a:schemeClr val="accent1"/>
+          </a:fillRef>
+          <a:effectRef idx="0">
+            <a:schemeClr val="accent1"/>
+          </a:effectRef>
+          <a:fontRef idx="minor">
+            <a:schemeClr val="lt1"/>
+          </a:fontRef>
+        </p:style>
+        <p:txBody>
+          <a:bodyPr rtlCol="0" anchor="t"/>
+          <a:lstStyle/>
+          <a:p>
+            <a:endParaRPr lang="pt-BR" dirty="0"/>
+          </a:p>
+        </p:txBody>
+      </p:sp>
+      <p:sp>
+        <p:nvSpPr>
+          <p:cNvPr id="62" name="Retângulo 61">
+            <a:extLst>
+              <a:ext uri="{FF2B5EF4-FFF2-40B4-BE49-F238E27FC236}">
+                <a16:creationId xmlns:a16="http://schemas.microsoft.com/office/drawing/2014/main" id="{DE0A23F4-1521-4261-8479-3A396FD64C36}"/>
+              </a:ext>
+            </a:extLst>
+          </p:cNvPr>
+          <p:cNvSpPr/>
+          <p:nvPr/>
+        </p:nvSpPr>
+        <p:spPr>
+          <a:xfrm>
+            <a:off x="1668730" y="1232965"/>
+            <a:ext cx="2559494" cy="272334"/>
+          </a:xfrm>
+          <a:prstGeom prst="rect">
+            <a:avLst/>
+          </a:prstGeom>
+          <a:solidFill>
+            <a:schemeClr val="accent4">
+              <a:lumMod val="75000"/>
+            </a:schemeClr>
+          </a:solidFill>
+          <a:ln>
+            <a:solidFill>
+              <a:schemeClr val="tx1"/>
+            </a:solidFill>
+          </a:ln>
+        </p:spPr>
+        <p:style>
+          <a:lnRef idx="2">
+            <a:schemeClr val="accent1">
+              <a:shade val="50000"/>
+            </a:schemeClr>
+          </a:lnRef>
+          <a:fillRef idx="1">
+            <a:schemeClr val="accent1"/>
+          </a:fillRef>
+          <a:effectRef idx="0">
+            <a:schemeClr val="accent1"/>
+          </a:effectRef>
+          <a:fontRef idx="minor">
+            <a:schemeClr val="lt1"/>
+          </a:fontRef>
+        </p:style>
+        <p:txBody>
+          <a:bodyPr rtlCol="0" anchor="t"/>
+          <a:lstStyle/>
+          <a:p>
+            <a:pPr algn="ctr"/>
+            <a:r>
+              <a:rPr lang="pt-BR" sz="1200" dirty="0" err="1"/>
+              <a:t>deleteDone</a:t>
+            </a:r>
+            <a:r>
+              <a:rPr lang="pt-BR" sz="1200" dirty="0"/>
+              <a:t>()</a:t>
+            </a:r>
+            <a:endParaRPr lang="pt-BR" dirty="0"/>
+          </a:p>
+        </p:txBody>
+      </p:sp>
+      <p:sp>
+        <p:nvSpPr>
+          <p:cNvPr id="66" name="Seta: para a Direita 65">
+            <a:extLst>
+              <a:ext uri="{FF2B5EF4-FFF2-40B4-BE49-F238E27FC236}">
+                <a16:creationId xmlns:a16="http://schemas.microsoft.com/office/drawing/2014/main" id="{CF0599AF-0010-472C-AC8A-549EE803D06F}"/>
+              </a:ext>
+            </a:extLst>
+          </p:cNvPr>
+          <p:cNvSpPr/>
+          <p:nvPr/>
+        </p:nvSpPr>
+        <p:spPr>
+          <a:xfrm>
+            <a:off x="284287" y="1669193"/>
+            <a:ext cx="1107347" cy="436228"/>
+          </a:xfrm>
+          <a:prstGeom prst="rightArrow">
+            <a:avLst/>
+          </a:prstGeom>
+          <a:solidFill>
+            <a:srgbClr val="FFFF00"/>
+          </a:solidFill>
+          <a:ln>
+            <a:solidFill>
+              <a:schemeClr val="tx1"/>
+            </a:solidFill>
+          </a:ln>
+        </p:spPr>
+        <p:style>
+          <a:lnRef idx="2">
+            <a:schemeClr val="accent1">
+              <a:shade val="50000"/>
+            </a:schemeClr>
+          </a:lnRef>
+          <a:fillRef idx="1">
+            <a:schemeClr val="accent1"/>
+          </a:fillRef>
+          <a:effectRef idx="0">
+            <a:schemeClr val="accent1"/>
+          </a:effectRef>
+          <a:fontRef idx="minor">
+            <a:schemeClr val="lt1"/>
+          </a:fontRef>
+        </p:style>
+        <p:txBody>
+          <a:bodyPr rtlCol="0" anchor="ctr"/>
+          <a:lstStyle/>
+          <a:p>
+            <a:pPr algn="ctr"/>
+            <a:r>
+              <a:rPr lang="pt-BR" sz="1200" dirty="0" err="1">
+                <a:solidFill>
+                  <a:schemeClr val="tx1"/>
+                </a:solidFill>
+              </a:rPr>
+              <a:t>deleteError</a:t>
+            </a:r>
+            <a:endParaRPr lang="pt-BR" sz="1200" dirty="0">
+              <a:solidFill>
+                <a:schemeClr val="tx1"/>
+              </a:solidFill>
+            </a:endParaRPr>
+          </a:p>
+        </p:txBody>
+      </p:sp>
+      <p:sp>
+        <p:nvSpPr>
+          <p:cNvPr id="67" name="Retângulo 66">
+            <a:extLst>
+              <a:ext uri="{FF2B5EF4-FFF2-40B4-BE49-F238E27FC236}">
+                <a16:creationId xmlns:a16="http://schemas.microsoft.com/office/drawing/2014/main" id="{88F2C6BA-A1AC-478E-9C52-95D3F6572939}"/>
+              </a:ext>
+            </a:extLst>
+          </p:cNvPr>
+          <p:cNvSpPr/>
+          <p:nvPr/>
+        </p:nvSpPr>
+        <p:spPr>
+          <a:xfrm>
+            <a:off x="1595928" y="1669193"/>
+            <a:ext cx="2705100" cy="436228"/>
+          </a:xfrm>
+          <a:prstGeom prst="rect">
+            <a:avLst/>
+          </a:prstGeom>
+          <a:solidFill>
+            <a:schemeClr val="accent2"/>
+          </a:solidFill>
+          <a:ln>
+            <a:solidFill>
+              <a:schemeClr val="tx1"/>
+            </a:solidFill>
+          </a:ln>
+        </p:spPr>
+        <p:style>
+          <a:lnRef idx="2">
+            <a:schemeClr val="accent1">
+              <a:shade val="50000"/>
+            </a:schemeClr>
+          </a:lnRef>
+          <a:fillRef idx="1">
+            <a:schemeClr val="accent1"/>
+          </a:fillRef>
+          <a:effectRef idx="0">
+            <a:schemeClr val="accent1"/>
+          </a:effectRef>
+          <a:fontRef idx="minor">
+            <a:schemeClr val="lt1"/>
+          </a:fontRef>
+        </p:style>
+        <p:txBody>
+          <a:bodyPr rtlCol="0" anchor="t"/>
+          <a:lstStyle/>
+          <a:p>
+            <a:endParaRPr lang="pt-BR" dirty="0"/>
+          </a:p>
+        </p:txBody>
+      </p:sp>
+      <p:sp>
+        <p:nvSpPr>
+          <p:cNvPr id="68" name="Retângulo 67">
+            <a:extLst>
+              <a:ext uri="{FF2B5EF4-FFF2-40B4-BE49-F238E27FC236}">
+                <a16:creationId xmlns:a16="http://schemas.microsoft.com/office/drawing/2014/main" id="{F94D01A0-770C-4856-A285-6EB08C76B66D}"/>
+              </a:ext>
+            </a:extLst>
+          </p:cNvPr>
+          <p:cNvSpPr/>
+          <p:nvPr/>
+        </p:nvSpPr>
+        <p:spPr>
+          <a:xfrm>
+            <a:off x="1668730" y="1746181"/>
+            <a:ext cx="2559494" cy="272334"/>
+          </a:xfrm>
+          <a:prstGeom prst="rect">
+            <a:avLst/>
+          </a:prstGeom>
+          <a:solidFill>
+            <a:schemeClr val="accent4">
+              <a:lumMod val="75000"/>
+            </a:schemeClr>
+          </a:solidFill>
+          <a:ln>
+            <a:solidFill>
+              <a:schemeClr val="tx1"/>
+            </a:solidFill>
+          </a:ln>
+        </p:spPr>
+        <p:style>
+          <a:lnRef idx="2">
+            <a:schemeClr val="accent1">
+              <a:shade val="50000"/>
+            </a:schemeClr>
+          </a:lnRef>
+          <a:fillRef idx="1">
+            <a:schemeClr val="accent1"/>
+          </a:fillRef>
+          <a:effectRef idx="0">
+            <a:schemeClr val="accent1"/>
+          </a:effectRef>
+          <a:fontRef idx="minor">
+            <a:schemeClr val="lt1"/>
+          </a:fontRef>
+        </p:style>
+        <p:txBody>
+          <a:bodyPr rtlCol="0" anchor="t"/>
+          <a:lstStyle/>
+          <a:p>
+            <a:pPr algn="ctr"/>
+            <a:r>
+              <a:rPr lang="pt-BR" sz="1200" dirty="0" err="1"/>
+              <a:t>deleteError</a:t>
+            </a:r>
+            <a:r>
+              <a:rPr lang="pt-BR" sz="1200" dirty="0"/>
+              <a:t>()</a:t>
+            </a:r>
+            <a:endParaRPr lang="pt-BR" dirty="0"/>
+          </a:p>
+        </p:txBody>
+      </p:sp>
+      <p:sp>
+        <p:nvSpPr>
+          <p:cNvPr id="76" name="Seta: para a Direita 75">
+            <a:extLst>
+              <a:ext uri="{FF2B5EF4-FFF2-40B4-BE49-F238E27FC236}">
+                <a16:creationId xmlns:a16="http://schemas.microsoft.com/office/drawing/2014/main" id="{56495266-A5E9-4BB8-A1CF-C6EC71F2A090}"/>
+              </a:ext>
+            </a:extLst>
+          </p:cNvPr>
+          <p:cNvSpPr/>
+          <p:nvPr/>
+        </p:nvSpPr>
+        <p:spPr>
+          <a:xfrm>
+            <a:off x="284287" y="2243981"/>
+            <a:ext cx="1107347" cy="436228"/>
+          </a:xfrm>
+          <a:prstGeom prst="rightArrow">
+            <a:avLst/>
+          </a:prstGeom>
+          <a:solidFill>
+            <a:srgbClr val="FFFF00"/>
+          </a:solidFill>
+          <a:ln>
+            <a:solidFill>
+              <a:schemeClr val="tx1"/>
+            </a:solidFill>
+          </a:ln>
+        </p:spPr>
+        <p:style>
+          <a:lnRef idx="2">
+            <a:schemeClr val="accent1">
+              <a:shade val="50000"/>
+            </a:schemeClr>
+          </a:lnRef>
+          <a:fillRef idx="1">
+            <a:schemeClr val="accent1"/>
+          </a:fillRef>
+          <a:effectRef idx="0">
+            <a:schemeClr val="accent1"/>
+          </a:effectRef>
+          <a:fontRef idx="minor">
+            <a:schemeClr val="lt1"/>
+          </a:fontRef>
+        </p:style>
+        <p:txBody>
+          <a:bodyPr rtlCol="0" anchor="ctr"/>
+          <a:lstStyle/>
+          <a:p>
+            <a:pPr algn="ctr"/>
+            <a:r>
+              <a:rPr lang="pt-BR" sz="1200" dirty="0" err="1">
+                <a:solidFill>
+                  <a:schemeClr val="tx1"/>
+                </a:solidFill>
+              </a:rPr>
+              <a:t>resendError</a:t>
+            </a:r>
+            <a:endParaRPr lang="pt-BR" sz="1200" dirty="0">
+              <a:solidFill>
+                <a:schemeClr val="tx1"/>
+              </a:solidFill>
+            </a:endParaRPr>
+          </a:p>
+        </p:txBody>
+      </p:sp>
+      <p:sp>
+        <p:nvSpPr>
+          <p:cNvPr id="77" name="Retângulo 76">
+            <a:extLst>
+              <a:ext uri="{FF2B5EF4-FFF2-40B4-BE49-F238E27FC236}">
+                <a16:creationId xmlns:a16="http://schemas.microsoft.com/office/drawing/2014/main" id="{5CE6E2A3-AC88-485B-B492-06E06BFA1E48}"/>
+              </a:ext>
+            </a:extLst>
+          </p:cNvPr>
+          <p:cNvSpPr/>
+          <p:nvPr/>
+        </p:nvSpPr>
+        <p:spPr>
+          <a:xfrm>
+            <a:off x="1595928" y="2243981"/>
+            <a:ext cx="2705100" cy="2682854"/>
+          </a:xfrm>
+          <a:prstGeom prst="rect">
+            <a:avLst/>
+          </a:prstGeom>
+          <a:solidFill>
+            <a:schemeClr val="accent2"/>
+          </a:solidFill>
+          <a:ln>
+            <a:solidFill>
+              <a:schemeClr val="tx1"/>
+            </a:solidFill>
+          </a:ln>
+        </p:spPr>
+        <p:style>
+          <a:lnRef idx="2">
+            <a:schemeClr val="accent1">
+              <a:shade val="50000"/>
+            </a:schemeClr>
+          </a:lnRef>
+          <a:fillRef idx="1">
+            <a:schemeClr val="accent1"/>
+          </a:fillRef>
+          <a:effectRef idx="0">
+            <a:schemeClr val="accent1"/>
+          </a:effectRef>
+          <a:fontRef idx="minor">
+            <a:schemeClr val="lt1"/>
+          </a:fontRef>
+        </p:style>
+        <p:txBody>
+          <a:bodyPr rtlCol="0" anchor="t"/>
+          <a:lstStyle/>
+          <a:p>
+            <a:endParaRPr lang="pt-BR" dirty="0"/>
+          </a:p>
+        </p:txBody>
+      </p:sp>
+      <p:sp>
+        <p:nvSpPr>
+          <p:cNvPr id="78" name="Retângulo 77">
+            <a:extLst>
+              <a:ext uri="{FF2B5EF4-FFF2-40B4-BE49-F238E27FC236}">
+                <a16:creationId xmlns:a16="http://schemas.microsoft.com/office/drawing/2014/main" id="{2D222D48-4619-4F19-ACD1-5DE6C81DB75B}"/>
+              </a:ext>
+            </a:extLst>
+          </p:cNvPr>
+          <p:cNvSpPr/>
+          <p:nvPr/>
+        </p:nvSpPr>
+        <p:spPr>
+          <a:xfrm>
+            <a:off x="1668730" y="2320969"/>
+            <a:ext cx="2559494" cy="272334"/>
+          </a:xfrm>
+          <a:prstGeom prst="rect">
+            <a:avLst/>
+          </a:prstGeom>
+          <a:solidFill>
+            <a:schemeClr val="accent4">
+              <a:lumMod val="75000"/>
+            </a:schemeClr>
+          </a:solidFill>
+          <a:ln>
+            <a:solidFill>
+              <a:schemeClr val="tx1"/>
+            </a:solidFill>
+          </a:ln>
+        </p:spPr>
+        <p:style>
+          <a:lnRef idx="2">
+            <a:schemeClr val="accent1">
+              <a:shade val="50000"/>
+            </a:schemeClr>
+          </a:lnRef>
+          <a:fillRef idx="1">
+            <a:schemeClr val="accent1"/>
+          </a:fillRef>
+          <a:effectRef idx="0">
+            <a:schemeClr val="accent1"/>
+          </a:effectRef>
+          <a:fontRef idx="minor">
+            <a:schemeClr val="lt1"/>
+          </a:fontRef>
+        </p:style>
+        <p:txBody>
+          <a:bodyPr rtlCol="0" anchor="t"/>
+          <a:lstStyle/>
+          <a:p>
+            <a:pPr algn="ctr"/>
+            <a:r>
+              <a:rPr lang="pt-BR" sz="1200" dirty="0" err="1"/>
+              <a:t>deleteError</a:t>
+            </a:r>
+            <a:r>
+              <a:rPr lang="pt-BR" sz="1200" dirty="0"/>
+              <a:t>()</a:t>
+            </a:r>
+            <a:endParaRPr lang="pt-BR" dirty="0"/>
+          </a:p>
+        </p:txBody>
+      </p:sp>
+    </p:spTree>
+    <p:extLst>
+      <p:ext uri="{BB962C8B-B14F-4D97-AF65-F5344CB8AC3E}">
+        <p14:creationId xmlns:p14="http://schemas.microsoft.com/office/powerpoint/2010/main" val="4152940524"/>
       </p:ext>
     </p:extLst>
   </p:cSld>

</xml_diff>